<commit_message>
Adiciona resultados para all-mpnet-base-v2
</commit_message>
<xml_diff>
--- a/6 - busca densa/notebook/apresentacao_notebook_dense_retriever.pptx
+++ b/6 - busca densa/notebook/apresentacao_notebook_dense_retriever.pptx
@@ -10568,14 +10568,14 @@
           <p:nvPr>
             <p:extLst>
               <p:ext uri="{D42A27DB-BD31-4B8C-83A1-F6EECF244321}">
-                <p14:modId xmlns:p14="http://schemas.microsoft.com/office/powerpoint/2010/main" val="2194097196"/>
+                <p14:modId xmlns:p14="http://schemas.microsoft.com/office/powerpoint/2010/main" val="3039776717"/>
               </p:ext>
             </p:extLst>
           </p:nvPr>
         </p:nvGraphicFramePr>
         <p:xfrm>
-          <a:off x="1937110" y="2614917"/>
-          <a:ext cx="8128000" cy="1854200"/>
+          <a:off x="750497" y="2614917"/>
+          <a:ext cx="10750808" cy="3235960"/>
         </p:xfrm>
         <a:graphic>
           <a:graphicData uri="http://schemas.openxmlformats.org/drawingml/2006/table">
@@ -10584,14 +10584,14 @@
                 <a:tableStyleId>{5C22544A-7EE6-4342-B048-85BDC9FD1C3A}</a:tableStyleId>
               </a:tblPr>
               <a:tblGrid>
-                <a:gridCol w="4064000">
+                <a:gridCol w="5375404">
                   <a:extLst>
                     <a:ext uri="{9D8B030D-6E8A-4147-A177-3AD203B41FA5}">
                       <a16:colId xmlns:a16="http://schemas.microsoft.com/office/drawing/2014/main" val="2911717806"/>
                     </a:ext>
                   </a:extLst>
                 </a:gridCol>
-                <a:gridCol w="4064000">
+                <a:gridCol w="5375404">
                   <a:extLst>
                     <a:ext uri="{9D8B030D-6E8A-4147-A177-3AD203B41FA5}">
                       <a16:colId xmlns:a16="http://schemas.microsoft.com/office/drawing/2014/main" val="124046871"/>
@@ -10699,6 +10699,62 @@
                 </a:extLst>
               </a:tr>
               <a:tr h="370840">
+                <a:tc gridSpan="2">
+                  <a:txBody>
+                    <a:bodyPr/>
+                    <a:lstStyle/>
+                    <a:p>
+                      <a:pPr marL="0" marR="0" lvl="0" indent="0" algn="ctr" defTabSz="914400" rtl="0" eaLnBrk="1" fontAlgn="auto" latinLnBrk="0" hangingPunct="1">
+                        <a:lnSpc>
+                          <a:spcPct val="100000"/>
+                        </a:lnSpc>
+                        <a:spcBef>
+                          <a:spcPts val="0"/>
+                        </a:spcBef>
+                        <a:spcAft>
+                          <a:spcPts val="0"/>
+                        </a:spcAft>
+                        <a:buClrTx/>
+                        <a:buSzTx/>
+                        <a:buFontTx/>
+                        <a:buNone/>
+                        <a:tabLst/>
+                        <a:defRPr/>
+                      </a:pPr>
+                      <a:r>
+                        <a:rPr lang="pt-BR" sz="1800" b="0" kern="1200" dirty="0">
+                          <a:solidFill>
+                            <a:schemeClr val="dk1"/>
+                          </a:solidFill>
+                          <a:effectLst/>
+                          <a:latin typeface="+mn-lt"/>
+                          <a:ea typeface="+mn-ea"/>
+                          <a:cs typeface="+mn-cs"/>
+                        </a:rPr>
+                        <a:t>Resultados dessa aula – busca densa</a:t>
+                      </a:r>
+                    </a:p>
+                  </a:txBody>
+                  <a:tcPr/>
+                </a:tc>
+                <a:tc hMerge="1">
+                  <a:txBody>
+                    <a:bodyPr/>
+                    <a:lstStyle/>
+                    <a:p>
+                      <a:pPr algn="ctr"/>
+                      <a:endParaRPr lang="pt-BR" dirty="0"/>
+                    </a:p>
+                  </a:txBody>
+                  <a:tcPr/>
+                </a:tc>
+                <a:extLst>
+                  <a:ext uri="{0D108BD9-81ED-4DB2-BD59-A6C34878D82A}">
+                    <a16:rowId xmlns:a16="http://schemas.microsoft.com/office/drawing/2014/main" val="3704755760"/>
+                  </a:ext>
+                </a:extLst>
+              </a:tr>
+              <a:tr h="370840">
                 <a:tc>
                   <a:txBody>
                     <a:bodyPr/>
@@ -10706,16 +10762,13 @@
                     <a:p>
                       <a:r>
                         <a:rPr lang="pt-BR" dirty="0"/>
-                        <a:t>Busca densa (consultando todos </a:t>
+                        <a:t>Implementação – busca em todos os </a:t>
                       </a:r>
                       <a:r>
                         <a:rPr lang="pt-BR" dirty="0" err="1"/>
-                        <a:t>doc</a:t>
+                        <a:t>docs</a:t>
                       </a:r>
-                      <a:r>
-                        <a:rPr lang="pt-BR" dirty="0"/>
-                        <a:t>)</a:t>
-                      </a:r>
+                      <a:endParaRPr lang="pt-BR" dirty="0"/>
                     </a:p>
                   </a:txBody>
                   <a:tcPr/>
@@ -10735,7 +10788,7 @@
                 </a:tc>
                 <a:extLst>
                   <a:ext uri="{0D108BD9-81ED-4DB2-BD59-A6C34878D82A}">
-                    <a16:rowId xmlns:a16="http://schemas.microsoft.com/office/drawing/2014/main" val="480027277"/>
+                    <a16:rowId xmlns:a16="http://schemas.microsoft.com/office/drawing/2014/main" val="3840731132"/>
                   </a:ext>
                 </a:extLst>
               </a:tr>
@@ -10747,15 +10800,15 @@
                     <a:p>
                       <a:r>
                         <a:rPr lang="pt-BR" dirty="0"/>
-                        <a:t>Busca densa (10 classes com </a:t>
+                        <a:t>Implementação – k </a:t>
                       </a:r>
                       <a:r>
                         <a:rPr lang="pt-BR" dirty="0" err="1"/>
-                        <a:t>kmeans</a:t>
+                        <a:t>means</a:t>
                       </a:r>
                       <a:r>
                         <a:rPr lang="pt-BR" dirty="0"/>
-                        <a:t>)</a:t>
+                        <a:t> 10 clusters</a:t>
                       </a:r>
                     </a:p>
                   </a:txBody>
@@ -10776,7 +10829,147 @@
                 </a:tc>
                 <a:extLst>
                   <a:ext uri="{0D108BD9-81ED-4DB2-BD59-A6C34878D82A}">
-                    <a16:rowId xmlns:a16="http://schemas.microsoft.com/office/drawing/2014/main" val="3949216877"/>
+                    <a16:rowId xmlns:a16="http://schemas.microsoft.com/office/drawing/2014/main" val="866636443"/>
+                  </a:ext>
+                </a:extLst>
+              </a:tr>
+              <a:tr h="370840">
+                <a:tc>
+                  <a:txBody>
+                    <a:bodyPr/>
+                    <a:lstStyle/>
+                    <a:p>
+                      <a:pPr marL="0" marR="0" lvl="0" indent="0" algn="l" defTabSz="914400" rtl="0" eaLnBrk="1" fontAlgn="auto" latinLnBrk="0" hangingPunct="1">
+                        <a:lnSpc>
+                          <a:spcPct val="100000"/>
+                        </a:lnSpc>
+                        <a:spcBef>
+                          <a:spcPts val="0"/>
+                        </a:spcBef>
+                        <a:spcAft>
+                          <a:spcPts val="0"/>
+                        </a:spcAft>
+                        <a:buClrTx/>
+                        <a:buSzTx/>
+                        <a:buFontTx/>
+                        <a:buNone/>
+                        <a:tabLst/>
+                        <a:defRPr/>
+                      </a:pPr>
+                      <a:r>
+                        <a:rPr lang="pt-BR" sz="1800" b="0" kern="1200" dirty="0">
+                          <a:solidFill>
+                            <a:schemeClr val="dk1"/>
+                          </a:solidFill>
+                          <a:effectLst/>
+                          <a:latin typeface="+mn-lt"/>
+                          <a:ea typeface="+mn-ea"/>
+                          <a:cs typeface="+mn-cs"/>
+                        </a:rPr>
+                        <a:t>Implementação – treinamento normalizando </a:t>
+                      </a:r>
+                      <a:r>
+                        <a:rPr lang="pt-BR" sz="1800" b="0" kern="1200" dirty="0" err="1">
+                          <a:solidFill>
+                            <a:schemeClr val="dk1"/>
+                          </a:solidFill>
+                          <a:effectLst/>
+                          <a:latin typeface="+mn-lt"/>
+                          <a:ea typeface="+mn-ea"/>
+                          <a:cs typeface="+mn-cs"/>
+                        </a:rPr>
+                        <a:t>docs</a:t>
+                      </a:r>
+                      <a:r>
+                        <a:rPr lang="pt-BR" sz="1800" b="0" kern="1200" dirty="0">
+                          <a:solidFill>
+                            <a:schemeClr val="dk1"/>
+                          </a:solidFill>
+                          <a:effectLst/>
+                          <a:latin typeface="+mn-lt"/>
+                          <a:ea typeface="+mn-ea"/>
+                          <a:cs typeface="+mn-cs"/>
+                        </a:rPr>
+                        <a:t> e queries</a:t>
+                      </a:r>
+                    </a:p>
+                  </a:txBody>
+                  <a:tcPr/>
+                </a:tc>
+                <a:tc>
+                  <a:txBody>
+                    <a:bodyPr/>
+                    <a:lstStyle/>
+                    <a:p>
+                      <a:r>
+                        <a:rPr lang="pt-BR" dirty="0"/>
+                        <a:t>0,0355</a:t>
+                      </a:r>
+                    </a:p>
+                  </a:txBody>
+                  <a:tcPr/>
+                </a:tc>
+                <a:extLst>
+                  <a:ext uri="{0D108BD9-81ED-4DB2-BD59-A6C34878D82A}">
+                    <a16:rowId xmlns:a16="http://schemas.microsoft.com/office/drawing/2014/main" val="257634599"/>
+                  </a:ext>
+                </a:extLst>
+              </a:tr>
+              <a:tr h="370840">
+                <a:tc>
+                  <a:txBody>
+                    <a:bodyPr/>
+                    <a:lstStyle/>
+                    <a:p>
+                      <a:pPr marL="0" marR="0" lvl="0" indent="0" algn="l" defTabSz="914400" rtl="0" eaLnBrk="1" fontAlgn="auto" latinLnBrk="0" hangingPunct="1">
+                        <a:lnSpc>
+                          <a:spcPct val="100000"/>
+                        </a:lnSpc>
+                        <a:spcBef>
+                          <a:spcPts val="0"/>
+                        </a:spcBef>
+                        <a:spcAft>
+                          <a:spcPts val="0"/>
+                        </a:spcAft>
+                        <a:buClrTx/>
+                        <a:buSzTx/>
+                        <a:buFontTx/>
+                        <a:buNone/>
+                        <a:tabLst/>
+                        <a:defRPr/>
+                      </a:pPr>
+                      <a:r>
+                        <a:rPr lang="pt-BR" sz="1800" b="0" kern="1200" dirty="0">
+                          <a:solidFill>
+                            <a:schemeClr val="dk1"/>
+                          </a:solidFill>
+                          <a:effectLst/>
+                          <a:latin typeface="+mn-lt"/>
+                          <a:ea typeface="+mn-ea"/>
+                          <a:cs typeface="+mn-cs"/>
+                        </a:rPr>
+                        <a:t>all-mpnet-base-v2</a:t>
+                      </a:r>
+                    </a:p>
+                  </a:txBody>
+                  <a:tcPr/>
+                </a:tc>
+                <a:tc>
+                  <a:txBody>
+                    <a:bodyPr/>
+                    <a:lstStyle/>
+                    <a:p>
+                      <a:r>
+                        <a:rPr lang="pt-BR" dirty="0"/>
+                        <a:t>0,5133</a:t>
+                      </a:r>
+                    </a:p>
+                  </a:txBody>
+                  <a:tcPr/>
+                </a:tc>
+                <a:extLst>
+                  <a:ext uri="{0D108BD9-81ED-4DB2-BD59-A6C34878D82A}">
+                    <a16:rowId xmlns:a16="http://schemas.microsoft.com/office/drawing/2014/main" val="558884008"/>
                   </a:ext>
                 </a:extLst>
               </a:tr>
@@ -12069,6 +12262,15 @@
 </file>
 
 <file path=customXml/item1.xml><?xml version="1.0" encoding="utf-8"?>
+<?mso-contentType ?>
+<FormTemplates xmlns="http://schemas.microsoft.com/sharepoint/v3/contenttype/forms">
+  <Display>DocumentLibraryForm</Display>
+  <Edit>DocumentLibraryForm</Edit>
+  <New>DocumentLibraryForm</New>
+</FormTemplates>
+</file>
+
+<file path=customXml/item2.xml><?xml version="1.0" encoding="utf-8"?>
 <ct:contentTypeSchema xmlns:ct="http://schemas.microsoft.com/office/2006/metadata/contentType" xmlns:ma="http://schemas.microsoft.com/office/2006/metadata/properties/metaAttributes" ct:_="" ma:_="" ma:contentTypeName="Document" ma:contentTypeID="0x01010079F111ED35F8CC479449609E8A0923A6" ma:contentTypeVersion="21" ma:contentTypeDescription="Create a new document." ma:contentTypeScope="" ma:versionID="64dfb1555687e0874b4304b796b5b0c7">
   <xsd:schema xmlns:xsd="http://www.w3.org/2001/XMLSchema" xmlns:xs="http://www.w3.org/2001/XMLSchema" xmlns:p="http://schemas.microsoft.com/office/2006/metadata/properties" xmlns:ns1="http://schemas.microsoft.com/sharepoint/v3" xmlns:ns2="71af3243-3dd4-4a8d-8c0d-dd76da1f02a5" xmlns:ns3="16c05727-aa75-4e4a-9b5f-8a80a1165891" xmlns:ns4="230e9df3-be65-4c73-a93b-d1236ebd677e" targetNamespace="http://schemas.microsoft.com/office/2006/metadata/properties" ma:root="true" ma:fieldsID="e6e4c555b5e194d05b7203de9c4567b3" ns1:_="" ns2:_="" ns3:_="" ns4:_="">
     <xsd:import namespace="http://schemas.microsoft.com/sharepoint/v3"/>
@@ -12350,15 +12552,6 @@
 </ct:contentTypeSchema>
 </file>
 
-<file path=customXml/item2.xml><?xml version="1.0" encoding="utf-8"?>
-<?mso-contentType ?>
-<FormTemplates xmlns="http://schemas.microsoft.com/sharepoint/v3/contenttype/forms">
-  <Display>DocumentLibraryForm</Display>
-  <Edit>DocumentLibraryForm</Edit>
-  <New>DocumentLibraryForm</New>
-</FormTemplates>
-</file>
-
 <file path=customXml/item3.xml><?xml version="1.0" encoding="utf-8"?>
 <p:properties xmlns:p="http://schemas.microsoft.com/office/2006/metadata/properties" xmlns:xsi="http://www.w3.org/2001/XMLSchema-instance" xmlns:pc="http://schemas.microsoft.com/office/infopath/2007/PartnerControls">
   <documentManagement>
@@ -12379,6 +12572,14 @@
 </file>
 
 <file path=customXml/itemProps1.xml><?xml version="1.0" encoding="utf-8"?>
+<ds:datastoreItem xmlns:ds="http://schemas.openxmlformats.org/officeDocument/2006/customXml" ds:itemID="{E618C13B-9D83-4AF4-B64D-33362D5133F8}">
+  <ds:schemaRefs>
+    <ds:schemaRef ds:uri="http://schemas.microsoft.com/sharepoint/v3/contenttype/forms"/>
+  </ds:schemaRefs>
+</ds:datastoreItem>
+</file>
+
+<file path=customXml/itemProps2.xml><?xml version="1.0" encoding="utf-8"?>
 <ds:datastoreItem xmlns:ds="http://schemas.openxmlformats.org/officeDocument/2006/customXml" ds:itemID="{67ACD96E-49A0-4DA4-A7BB-AC2D8874213F}">
   <ds:schemaRefs>
     <ds:schemaRef ds:uri="http://schemas.microsoft.com/office/2006/metadata/contentType"/>
@@ -12395,14 +12596,6 @@
     <ds:schemaRef ds:uri="http://purl.org/dc/elements/1.1/"/>
     <ds:schemaRef ds:uri="http://purl.org/dc/terms/"/>
     <ds:schemaRef ds:uri="http://schemas.microsoft.com/internal/obd"/>
-  </ds:schemaRefs>
-</ds:datastoreItem>
-</file>
-
-<file path=customXml/itemProps2.xml><?xml version="1.0" encoding="utf-8"?>
-<ds:datastoreItem xmlns:ds="http://schemas.openxmlformats.org/officeDocument/2006/customXml" ds:itemID="{E618C13B-9D83-4AF4-B64D-33362D5133F8}">
-  <ds:schemaRefs>
-    <ds:schemaRef ds:uri="http://schemas.microsoft.com/sharepoint/v3/contenttype/forms"/>
   </ds:schemaRefs>
 </ds:datastoreItem>
 </file>

</xml_diff>

<commit_message>
Teste usando sentence transformers
</commit_message>
<xml_diff>
--- a/6 - busca densa/notebook/apresentacao_notebook_dense_retriever.pptx
+++ b/6 - busca densa/notebook/apresentacao_notebook_dense_retriever.pptx
@@ -234,7 +234,7 @@
             <a:pPr rtl="0"/>
             <a:fld id="{1CFE3099-591D-45A7-A51D-7A26F574396C}" type="datetime1">
               <a:rPr lang="pt-BR" smtClean="0"/>
-              <a:t>16/04/2023</a:t>
+              <a:t>17/04/2023</a:t>
             </a:fld>
             <a:endParaRPr lang="pt-BR" dirty="0"/>
           </a:p>
@@ -415,7 +415,7 @@
             <a:fld id="{04512B0B-086E-405E-B6A3-A336C302B6B7}" type="datetime1">
               <a:rPr lang="pt-BR" smtClean="0"/>
               <a:pPr/>
-              <a:t>16/04/2023</a:t>
+              <a:t>17/04/2023</a:t>
             </a:fld>
             <a:endParaRPr lang="pt-BR" dirty="0"/>
           </a:p>
@@ -10568,14 +10568,14 @@
           <p:nvPr>
             <p:extLst>
               <p:ext uri="{D42A27DB-BD31-4B8C-83A1-F6EECF244321}">
-                <p14:modId xmlns:p14="http://schemas.microsoft.com/office/powerpoint/2010/main" val="3039776717"/>
+                <p14:modId xmlns:p14="http://schemas.microsoft.com/office/powerpoint/2010/main" val="3863121625"/>
               </p:ext>
             </p:extLst>
           </p:nvPr>
         </p:nvGraphicFramePr>
         <p:xfrm>
-          <a:off x="750497" y="2614917"/>
-          <a:ext cx="10750808" cy="3235960"/>
+          <a:off x="720596" y="1941005"/>
+          <a:ext cx="10750808" cy="3977640"/>
         </p:xfrm>
         <a:graphic>
           <a:graphicData uri="http://schemas.openxmlformats.org/drawingml/2006/table">
@@ -10970,6 +10970,122 @@
                 <a:extLst>
                   <a:ext uri="{0D108BD9-81ED-4DB2-BD59-A6C34878D82A}">
                     <a16:rowId xmlns:a16="http://schemas.microsoft.com/office/drawing/2014/main" val="558884008"/>
+                  </a:ext>
+                </a:extLst>
+              </a:tr>
+              <a:tr h="370840">
+                <a:tc>
+                  <a:txBody>
+                    <a:bodyPr/>
+                    <a:lstStyle/>
+                    <a:p>
+                      <a:pPr marL="0" marR="0" lvl="0" indent="0" algn="l" defTabSz="914400" rtl="0" eaLnBrk="1" fontAlgn="auto" latinLnBrk="0" hangingPunct="1">
+                        <a:lnSpc>
+                          <a:spcPct val="100000"/>
+                        </a:lnSpc>
+                        <a:spcBef>
+                          <a:spcPts val="0"/>
+                        </a:spcBef>
+                        <a:spcAft>
+                          <a:spcPts val="0"/>
+                        </a:spcAft>
+                        <a:buClrTx/>
+                        <a:buSzTx/>
+                        <a:buFontTx/>
+                        <a:buNone/>
+                        <a:tabLst/>
+                        <a:defRPr/>
+                      </a:pPr>
+                      <a:r>
+                        <a:rPr lang="sv-SE" sz="1800" b="0" kern="1200" dirty="0">
+                          <a:solidFill>
+                            <a:schemeClr val="dk1"/>
+                          </a:solidFill>
+                          <a:effectLst/>
+                          <a:latin typeface="+mn-lt"/>
+                          <a:ea typeface="+mn-ea"/>
+                          <a:cs typeface="+mn-cs"/>
+                        </a:rPr>
+                        <a:t>all-MiniLM-L12-v2</a:t>
+                      </a:r>
+                    </a:p>
+                  </a:txBody>
+                  <a:tcPr/>
+                </a:tc>
+                <a:tc>
+                  <a:txBody>
+                    <a:bodyPr/>
+                    <a:lstStyle/>
+                    <a:p>
+                      <a:r>
+                        <a:rPr lang="pt-BR" dirty="0"/>
+                        <a:t>0,5082</a:t>
+                      </a:r>
+                    </a:p>
+                  </a:txBody>
+                  <a:tcPr/>
+                </a:tc>
+                <a:extLst>
+                  <a:ext uri="{0D108BD9-81ED-4DB2-BD59-A6C34878D82A}">
+                    <a16:rowId xmlns:a16="http://schemas.microsoft.com/office/drawing/2014/main" val="1955744297"/>
+                  </a:ext>
+                </a:extLst>
+              </a:tr>
+              <a:tr h="370840">
+                <a:tc>
+                  <a:txBody>
+                    <a:bodyPr/>
+                    <a:lstStyle/>
+                    <a:p>
+                      <a:pPr marL="0" marR="0" lvl="0" indent="0" algn="l" defTabSz="914400" rtl="0" eaLnBrk="1" fontAlgn="auto" latinLnBrk="0" hangingPunct="1">
+                        <a:lnSpc>
+                          <a:spcPct val="100000"/>
+                        </a:lnSpc>
+                        <a:spcBef>
+                          <a:spcPts val="0"/>
+                        </a:spcBef>
+                        <a:spcAft>
+                          <a:spcPts val="0"/>
+                        </a:spcAft>
+                        <a:buClrTx/>
+                        <a:buSzTx/>
+                        <a:buFontTx/>
+                        <a:buNone/>
+                        <a:tabLst/>
+                        <a:defRPr/>
+                      </a:pPr>
+                      <a:r>
+                        <a:rPr lang="sv-SE" sz="1800" b="0" kern="1200" dirty="0">
+                          <a:solidFill>
+                            <a:schemeClr val="dk1"/>
+                          </a:solidFill>
+                          <a:effectLst/>
+                          <a:latin typeface="+mn-lt"/>
+                          <a:ea typeface="+mn-ea"/>
+                          <a:cs typeface="+mn-cs"/>
+                        </a:rPr>
+                        <a:t>BM25 com 1000 hits e usar busca densa pra reranking</a:t>
+                      </a:r>
+                    </a:p>
+                  </a:txBody>
+                  <a:tcPr/>
+                </a:tc>
+                <a:tc>
+                  <a:txBody>
+                    <a:bodyPr/>
+                    <a:lstStyle/>
+                    <a:p>
+                      <a:r>
+                        <a:rPr lang="pt-BR" dirty="0"/>
+                        <a:t>TODO</a:t>
+                      </a:r>
+                    </a:p>
+                  </a:txBody>
+                  <a:tcPr/>
+                </a:tc>
+                <a:extLst>
+                  <a:ext uri="{0D108BD9-81ED-4DB2-BD59-A6C34878D82A}">
+                    <a16:rowId xmlns:a16="http://schemas.microsoft.com/office/drawing/2014/main" val="2090769235"/>
                   </a:ext>
                 </a:extLst>
               </a:tr>
@@ -12262,15 +12378,6 @@
 </file>
 
 <file path=customXml/item1.xml><?xml version="1.0" encoding="utf-8"?>
-<?mso-contentType ?>
-<FormTemplates xmlns="http://schemas.microsoft.com/sharepoint/v3/contenttype/forms">
-  <Display>DocumentLibraryForm</Display>
-  <Edit>DocumentLibraryForm</Edit>
-  <New>DocumentLibraryForm</New>
-</FormTemplates>
-</file>
-
-<file path=customXml/item2.xml><?xml version="1.0" encoding="utf-8"?>
 <ct:contentTypeSchema xmlns:ct="http://schemas.microsoft.com/office/2006/metadata/contentType" xmlns:ma="http://schemas.microsoft.com/office/2006/metadata/properties/metaAttributes" ct:_="" ma:_="" ma:contentTypeName="Document" ma:contentTypeID="0x01010079F111ED35F8CC479449609E8A0923A6" ma:contentTypeVersion="21" ma:contentTypeDescription="Create a new document." ma:contentTypeScope="" ma:versionID="64dfb1555687e0874b4304b796b5b0c7">
   <xsd:schema xmlns:xsd="http://www.w3.org/2001/XMLSchema" xmlns:xs="http://www.w3.org/2001/XMLSchema" xmlns:p="http://schemas.microsoft.com/office/2006/metadata/properties" xmlns:ns1="http://schemas.microsoft.com/sharepoint/v3" xmlns:ns2="71af3243-3dd4-4a8d-8c0d-dd76da1f02a5" xmlns:ns3="16c05727-aa75-4e4a-9b5f-8a80a1165891" xmlns:ns4="230e9df3-be65-4c73-a93b-d1236ebd677e" targetNamespace="http://schemas.microsoft.com/office/2006/metadata/properties" ma:root="true" ma:fieldsID="e6e4c555b5e194d05b7203de9c4567b3" ns1:_="" ns2:_="" ns3:_="" ns4:_="">
     <xsd:import namespace="http://schemas.microsoft.com/sharepoint/v3"/>
@@ -12552,6 +12659,15 @@
 </ct:contentTypeSchema>
 </file>
 
+<file path=customXml/item2.xml><?xml version="1.0" encoding="utf-8"?>
+<?mso-contentType ?>
+<FormTemplates xmlns="http://schemas.microsoft.com/sharepoint/v3/contenttype/forms">
+  <Display>DocumentLibraryForm</Display>
+  <Edit>DocumentLibraryForm</Edit>
+  <New>DocumentLibraryForm</New>
+</FormTemplates>
+</file>
+
 <file path=customXml/item3.xml><?xml version="1.0" encoding="utf-8"?>
 <p:properties xmlns:p="http://schemas.microsoft.com/office/2006/metadata/properties" xmlns:xsi="http://www.w3.org/2001/XMLSchema-instance" xmlns:pc="http://schemas.microsoft.com/office/infopath/2007/PartnerControls">
   <documentManagement>
@@ -12572,14 +12688,6 @@
 </file>
 
 <file path=customXml/itemProps1.xml><?xml version="1.0" encoding="utf-8"?>
-<ds:datastoreItem xmlns:ds="http://schemas.openxmlformats.org/officeDocument/2006/customXml" ds:itemID="{E618C13B-9D83-4AF4-B64D-33362D5133F8}">
-  <ds:schemaRefs>
-    <ds:schemaRef ds:uri="http://schemas.microsoft.com/sharepoint/v3/contenttype/forms"/>
-  </ds:schemaRefs>
-</ds:datastoreItem>
-</file>
-
-<file path=customXml/itemProps2.xml><?xml version="1.0" encoding="utf-8"?>
 <ds:datastoreItem xmlns:ds="http://schemas.openxmlformats.org/officeDocument/2006/customXml" ds:itemID="{67ACD96E-49A0-4DA4-A7BB-AC2D8874213F}">
   <ds:schemaRefs>
     <ds:schemaRef ds:uri="http://schemas.microsoft.com/office/2006/metadata/contentType"/>
@@ -12596,6 +12704,14 @@
     <ds:schemaRef ds:uri="http://purl.org/dc/elements/1.1/"/>
     <ds:schemaRef ds:uri="http://purl.org/dc/terms/"/>
     <ds:schemaRef ds:uri="http://schemas.microsoft.com/internal/obd"/>
+  </ds:schemaRefs>
+</ds:datastoreItem>
+</file>
+
+<file path=customXml/itemProps2.xml><?xml version="1.0" encoding="utf-8"?>
+<ds:datastoreItem xmlns:ds="http://schemas.openxmlformats.org/officeDocument/2006/customXml" ds:itemID="{E618C13B-9D83-4AF4-B64D-33362D5133F8}">
+  <ds:schemaRefs>
+    <ds:schemaRef ds:uri="http://schemas.microsoft.com/sharepoint/v3/contenttype/forms"/>
   </ds:schemaRefs>
 </ds:datastoreItem>
 </file>

</xml_diff>

<commit_message>
Inserido mais um caderno pra aula 6. Alterada apresentação
</commit_message>
<xml_diff>
--- a/6 - busca densa/notebook/apresentacao_notebook_dense_retriever.pptx
+++ b/6 - busca densa/notebook/apresentacao_notebook_dense_retriever.pptx
@@ -234,7 +234,7 @@
             <a:pPr rtl="0"/>
             <a:fld id="{1CFE3099-591D-45A7-A51D-7A26F574396C}" type="datetime1">
               <a:rPr lang="pt-BR" smtClean="0"/>
-              <a:t>17/04/2023</a:t>
+              <a:t>19/04/2023</a:t>
             </a:fld>
             <a:endParaRPr lang="pt-BR" dirty="0"/>
           </a:p>
@@ -415,7 +415,7 @@
             <a:fld id="{04512B0B-086E-405E-B6A3-A336C302B6B7}" type="datetime1">
               <a:rPr lang="pt-BR" smtClean="0"/>
               <a:pPr/>
-              <a:t>17/04/2023</a:t>
+              <a:t>19/04/2023</a:t>
             </a:fld>
             <a:endParaRPr lang="pt-BR" dirty="0"/>
           </a:p>
@@ -10419,7 +10419,27 @@
                 <a:latin typeface="Arial" panose="020B0604020202020204" pitchFamily="34" charset="0"/>
                 <a:cs typeface="Arial" panose="020B0604020202020204" pitchFamily="34" charset="0"/>
               </a:rPr>
-              <a:t>. Sem normalizar, resolveu.</a:t>
+              <a:t>. Sem normalizar, resolveu. Ou alterando a forma de cálculo da </a:t>
+            </a:r>
+            <a:r>
+              <a:rPr lang="pt-BR" sz="2400" dirty="0" err="1">
+                <a:solidFill>
+                  <a:schemeClr val="accent1"/>
+                </a:solidFill>
+                <a:latin typeface="Arial" panose="020B0604020202020204" pitchFamily="34" charset="0"/>
+                <a:cs typeface="Arial" panose="020B0604020202020204" pitchFamily="34" charset="0"/>
+              </a:rPr>
+              <a:t>loss</a:t>
+            </a:r>
+            <a:r>
+              <a:rPr lang="pt-BR" sz="2400" dirty="0">
+                <a:solidFill>
+                  <a:schemeClr val="accent1"/>
+                </a:solidFill>
+                <a:latin typeface="Arial" panose="020B0604020202020204" pitchFamily="34" charset="0"/>
+                <a:cs typeface="Arial" panose="020B0604020202020204" pitchFamily="34" charset="0"/>
+              </a:rPr>
+              <a:t>.</a:t>
             </a:r>
           </a:p>
           <a:p>
@@ -10435,8 +10455,9 @@
             </a:endParaRPr>
           </a:p>
           <a:p>
-            <a:pPr marL="0" indent="0">
-              <a:buNone/>
+            <a:pPr>
+              <a:buFont typeface="Symbol" panose="05050102010706020507" pitchFamily="18" charset="2"/>
+              <a:buChar char="Þ"/>
             </a:pPr>
             <a:r>
               <a:rPr lang="pt-BR" sz="2400" dirty="0">
@@ -10446,7 +10467,43 @@
                 <a:latin typeface="Arial" panose="020B0604020202020204" pitchFamily="34" charset="0"/>
                 <a:cs typeface="Arial" panose="020B0604020202020204" pitchFamily="34" charset="0"/>
               </a:rPr>
-              <a:t>=&gt; Em ambos os casos tive ajuda do Eduardo.</a:t>
+              <a:t> Em ambos os casos tive ajuda do Eduardo.</a:t>
+            </a:r>
+          </a:p>
+          <a:p>
+            <a:pPr>
+              <a:buFont typeface="Symbol" panose="05050102010706020507" pitchFamily="18" charset="2"/>
+              <a:buChar char="Þ"/>
+            </a:pPr>
+            <a:r>
+              <a:rPr lang="pt-BR" sz="2400" dirty="0">
+                <a:solidFill>
+                  <a:schemeClr val="accent1"/>
+                </a:solidFill>
+                <a:latin typeface="Arial" panose="020B0604020202020204" pitchFamily="34" charset="0"/>
+                <a:cs typeface="Arial" panose="020B0604020202020204" pitchFamily="34" charset="0"/>
+              </a:rPr>
+              <a:t> Alteração do cálculo da </a:t>
+            </a:r>
+            <a:r>
+              <a:rPr lang="pt-BR" sz="2400" dirty="0" err="1">
+                <a:solidFill>
+                  <a:schemeClr val="accent1"/>
+                </a:solidFill>
+                <a:latin typeface="Arial" panose="020B0604020202020204" pitchFamily="34" charset="0"/>
+                <a:cs typeface="Arial" panose="020B0604020202020204" pitchFamily="34" charset="0"/>
+              </a:rPr>
+              <a:t>loss</a:t>
+            </a:r>
+            <a:r>
+              <a:rPr lang="pt-BR" sz="2400" dirty="0">
+                <a:solidFill>
+                  <a:schemeClr val="accent1"/>
+                </a:solidFill>
+                <a:latin typeface="Arial" panose="020B0604020202020204" pitchFamily="34" charset="0"/>
+                <a:cs typeface="Arial" panose="020B0604020202020204" pitchFamily="34" charset="0"/>
+              </a:rPr>
+              <a:t>: discussão no Slack (Gustavo e Pedro Holanda)</a:t>
             </a:r>
           </a:p>
         </p:txBody>
@@ -10568,7 +10625,7 @@
           <p:nvPr>
             <p:extLst>
               <p:ext uri="{D42A27DB-BD31-4B8C-83A1-F6EECF244321}">
-                <p14:modId xmlns:p14="http://schemas.microsoft.com/office/powerpoint/2010/main" val="3863121625"/>
+                <p14:modId xmlns:p14="http://schemas.microsoft.com/office/powerpoint/2010/main" val="726622804"/>
               </p:ext>
             </p:extLst>
           </p:nvPr>
@@ -10903,7 +10960,29 @@
                     <a:p>
                       <a:r>
                         <a:rPr lang="pt-BR" dirty="0"/>
-                        <a:t>0,0355</a:t>
+                        <a:t>0,0355 (</a:t>
+                      </a:r>
+                      <a:r>
+                        <a:rPr lang="pt-BR" dirty="0" err="1"/>
+                        <a:t>Loss</a:t>
+                      </a:r>
+                      <a:r>
+                        <a:rPr lang="pt-BR" dirty="0"/>
+                        <a:t> conforme artigo)</a:t>
+                      </a:r>
+                    </a:p>
+                    <a:p>
+                      <a:r>
+                        <a:rPr lang="pt-BR" dirty="0"/>
+                        <a:t>0,3567 (</a:t>
+                      </a:r>
+                      <a:r>
+                        <a:rPr lang="pt-BR" dirty="0" err="1"/>
+                        <a:t>Loss</a:t>
+                      </a:r>
+                      <a:r>
+                        <a:rPr lang="pt-BR" dirty="0"/>
+                        <a:t> com sim. sendo dividida por 0.02)</a:t>
                       </a:r>
                     </a:p>
                   </a:txBody>
@@ -11398,34 +11477,27 @@
                 <a:latin typeface="Arial" panose="020B0604020202020204" pitchFamily="34" charset="0"/>
                 <a:cs typeface="Arial" panose="020B0604020202020204" pitchFamily="34" charset="0"/>
               </a:rPr>
-              <a:t>O primeiro problema que tive foi resolvido quando parei de normalizar os vetores da query e do documento.</a:t>
-            </a:r>
-          </a:p>
-          <a:p>
-            <a:pPr marL="0" indent="0">
-              <a:buNone/>
-            </a:pPr>
-            <a:endParaRPr lang="pt-BR" sz="2400" dirty="0">
-              <a:solidFill>
-                <a:schemeClr val="accent1"/>
-              </a:solidFill>
-              <a:latin typeface="Arial" panose="020B0604020202020204" pitchFamily="34" charset="0"/>
-              <a:cs typeface="Arial" panose="020B0604020202020204" pitchFamily="34" charset="0"/>
-            </a:endParaRPr>
-          </a:p>
-          <a:p>
-            <a:pPr marL="0" indent="0">
-              <a:buNone/>
-            </a:pPr>
-            <a:r>
-              <a:rPr lang="pt-BR" sz="2400" dirty="0">
+              <a:t>A questão da normalização dos vetores e a </a:t>
+            </a:r>
+            <a:r>
+              <a:rPr lang="pt-BR" sz="2400" dirty="0" err="1">
                 <a:solidFill>
                   <a:schemeClr val="accent1"/>
                 </a:solidFill>
                 <a:latin typeface="Arial" panose="020B0604020202020204" pitchFamily="34" charset="0"/>
                 <a:cs typeface="Arial" panose="020B0604020202020204" pitchFamily="34" charset="0"/>
               </a:rPr>
-              <a:t>Porque não podemos normalizar os vetores? Não era pra dar o mesmo resultado?</a:t>
+              <a:t>loss</a:t>
+            </a:r>
+            <a:r>
+              <a:rPr lang="pt-BR" sz="2400" dirty="0">
+                <a:solidFill>
+                  <a:schemeClr val="accent1"/>
+                </a:solidFill>
+                <a:latin typeface="Arial" panose="020B0604020202020204" pitchFamily="34" charset="0"/>
+                <a:cs typeface="Arial" panose="020B0604020202020204" pitchFamily="34" charset="0"/>
+              </a:rPr>
+              <a:t>.</a:t>
             </a:r>
           </a:p>
         </p:txBody>
@@ -12378,6 +12450,15 @@
 </file>
 
 <file path=customXml/item1.xml><?xml version="1.0" encoding="utf-8"?>
+<?mso-contentType ?>
+<FormTemplates xmlns="http://schemas.microsoft.com/sharepoint/v3/contenttype/forms">
+  <Display>DocumentLibraryForm</Display>
+  <Edit>DocumentLibraryForm</Edit>
+  <New>DocumentLibraryForm</New>
+</FormTemplates>
+</file>
+
+<file path=customXml/item2.xml><?xml version="1.0" encoding="utf-8"?>
 <ct:contentTypeSchema xmlns:ct="http://schemas.microsoft.com/office/2006/metadata/contentType" xmlns:ma="http://schemas.microsoft.com/office/2006/metadata/properties/metaAttributes" ct:_="" ma:_="" ma:contentTypeName="Document" ma:contentTypeID="0x01010079F111ED35F8CC479449609E8A0923A6" ma:contentTypeVersion="21" ma:contentTypeDescription="Create a new document." ma:contentTypeScope="" ma:versionID="64dfb1555687e0874b4304b796b5b0c7">
   <xsd:schema xmlns:xsd="http://www.w3.org/2001/XMLSchema" xmlns:xs="http://www.w3.org/2001/XMLSchema" xmlns:p="http://schemas.microsoft.com/office/2006/metadata/properties" xmlns:ns1="http://schemas.microsoft.com/sharepoint/v3" xmlns:ns2="71af3243-3dd4-4a8d-8c0d-dd76da1f02a5" xmlns:ns3="16c05727-aa75-4e4a-9b5f-8a80a1165891" xmlns:ns4="230e9df3-be65-4c73-a93b-d1236ebd677e" targetNamespace="http://schemas.microsoft.com/office/2006/metadata/properties" ma:root="true" ma:fieldsID="e6e4c555b5e194d05b7203de9c4567b3" ns1:_="" ns2:_="" ns3:_="" ns4:_="">
     <xsd:import namespace="http://schemas.microsoft.com/sharepoint/v3"/>
@@ -12659,15 +12740,6 @@
 </ct:contentTypeSchema>
 </file>
 
-<file path=customXml/item2.xml><?xml version="1.0" encoding="utf-8"?>
-<?mso-contentType ?>
-<FormTemplates xmlns="http://schemas.microsoft.com/sharepoint/v3/contenttype/forms">
-  <Display>DocumentLibraryForm</Display>
-  <Edit>DocumentLibraryForm</Edit>
-  <New>DocumentLibraryForm</New>
-</FormTemplates>
-</file>
-
 <file path=customXml/item3.xml><?xml version="1.0" encoding="utf-8"?>
 <p:properties xmlns:p="http://schemas.microsoft.com/office/2006/metadata/properties" xmlns:xsi="http://www.w3.org/2001/XMLSchema-instance" xmlns:pc="http://schemas.microsoft.com/office/infopath/2007/PartnerControls">
   <documentManagement>
@@ -12688,6 +12760,14 @@
 </file>
 
 <file path=customXml/itemProps1.xml><?xml version="1.0" encoding="utf-8"?>
+<ds:datastoreItem xmlns:ds="http://schemas.openxmlformats.org/officeDocument/2006/customXml" ds:itemID="{E618C13B-9D83-4AF4-B64D-33362D5133F8}">
+  <ds:schemaRefs>
+    <ds:schemaRef ds:uri="http://schemas.microsoft.com/sharepoint/v3/contenttype/forms"/>
+  </ds:schemaRefs>
+</ds:datastoreItem>
+</file>
+
+<file path=customXml/itemProps2.xml><?xml version="1.0" encoding="utf-8"?>
 <ds:datastoreItem xmlns:ds="http://schemas.openxmlformats.org/officeDocument/2006/customXml" ds:itemID="{67ACD96E-49A0-4DA4-A7BB-AC2D8874213F}">
   <ds:schemaRefs>
     <ds:schemaRef ds:uri="http://schemas.microsoft.com/office/2006/metadata/contentType"/>
@@ -12708,29 +12788,21 @@
 </ds:datastoreItem>
 </file>
 
-<file path=customXml/itemProps2.xml><?xml version="1.0" encoding="utf-8"?>
-<ds:datastoreItem xmlns:ds="http://schemas.openxmlformats.org/officeDocument/2006/customXml" ds:itemID="{E618C13B-9D83-4AF4-B64D-33362D5133F8}">
-  <ds:schemaRefs>
-    <ds:schemaRef ds:uri="http://schemas.microsoft.com/sharepoint/v3/contenttype/forms"/>
-  </ds:schemaRefs>
-</ds:datastoreItem>
-</file>
-
 <file path=customXml/itemProps3.xml><?xml version="1.0" encoding="utf-8"?>
 <ds:datastoreItem xmlns:ds="http://schemas.openxmlformats.org/officeDocument/2006/customXml" ds:itemID="{CA4F7154-AFAC-4BE7-8A74-7F4B6FC2743C}">
   <ds:schemaRefs>
-    <ds:schemaRef ds:uri="http://www.w3.org/XML/1998/namespace"/>
+    <ds:schemaRef ds:uri="http://schemas.microsoft.com/office/2006/documentManagement/types"/>
+    <ds:schemaRef ds:uri="http://purl.org/dc/dcmitype/"/>
     <ds:schemaRef ds:uri="http://purl.org/dc/terms/"/>
     <ds:schemaRef ds:uri="http://schemas.openxmlformats.org/package/2006/metadata/core-properties"/>
-    <ds:schemaRef ds:uri="http://schemas.microsoft.com/office/2006/documentManagement/types"/>
+    <ds:schemaRef ds:uri="71af3243-3dd4-4a8d-8c0d-dd76da1f02a5"/>
+    <ds:schemaRef ds:uri="230e9df3-be65-4c73-a93b-d1236ebd677e"/>
+    <ds:schemaRef ds:uri="http://purl.org/dc/elements/1.1/"/>
+    <ds:schemaRef ds:uri="16c05727-aa75-4e4a-9b5f-8a80a1165891"/>
+    <ds:schemaRef ds:uri="http://schemas.microsoft.com/sharepoint/v3"/>
+    <ds:schemaRef ds:uri="http://schemas.microsoft.com/office/infopath/2007/PartnerControls"/>
     <ds:schemaRef ds:uri="http://schemas.microsoft.com/office/2006/metadata/properties"/>
-    <ds:schemaRef ds:uri="http://schemas.microsoft.com/office/infopath/2007/PartnerControls"/>
-    <ds:schemaRef ds:uri="230e9df3-be65-4c73-a93b-d1236ebd677e"/>
-    <ds:schemaRef ds:uri="http://purl.org/dc/dcmitype/"/>
-    <ds:schemaRef ds:uri="16c05727-aa75-4e4a-9b5f-8a80a1165891"/>
-    <ds:schemaRef ds:uri="71af3243-3dd4-4a8d-8c0d-dd76da1f02a5"/>
-    <ds:schemaRef ds:uri="http://schemas.microsoft.com/sharepoint/v3"/>
-    <ds:schemaRef ds:uri="http://purl.org/dc/elements/1.1/"/>
+    <ds:schemaRef ds:uri="http://www.w3.org/XML/1998/namespace"/>
   </ds:schemaRefs>
 </ds:datastoreItem>
 </file>

</xml_diff>